<commit_message>
Deployment Diagram and describe
</commit_message>
<xml_diff>
--- a/DD/PPTImageTool/PPTImage.pptx
+++ b/DD/PPTImageTool/PPTImage.pptx
@@ -4,6 +4,9 @@
   <p:sldMasterIdLst>
     <p:sldMasterId id="2147483648" r:id="rId1"/>
   </p:sldMasterIdLst>
+  <p:notesMasterIdLst>
+    <p:notesMasterId r:id="rId4"/>
+  </p:notesMasterIdLst>
   <p:sldIdLst>
     <p:sldId id="256" r:id="rId2"/>
     <p:sldId id="257" r:id="rId3"/>
@@ -105,7 +108,446 @@
       </a:defRPr>
     </a:lvl9pPr>
   </p:defaultTextStyle>
+  <p:extLst>
+    <p:ext uri="{EFAFB233-063F-42B5-8137-9DF3F51BA10A}">
+      <p15:sldGuideLst xmlns:p15="http://schemas.microsoft.com/office/powerpoint/2012/main"/>
+    </p:ext>
+  </p:extLst>
 </p:presentation>
+</file>
+
+<file path=ppt/notesMasters/notesMaster1.xml><?xml version="1.0" encoding="utf-8"?>
+<p:notesMaster xmlns:a="http://schemas.openxmlformats.org/drawingml/2006/main" xmlns:r="http://schemas.openxmlformats.org/officeDocument/2006/relationships" xmlns:p="http://schemas.openxmlformats.org/presentationml/2006/main">
+  <p:cSld>
+    <p:bg>
+      <p:bgRef idx="1001">
+        <a:schemeClr val="bg1"/>
+      </p:bgRef>
+    </p:bg>
+    <p:spTree>
+      <p:nvGrpSpPr>
+        <p:cNvPr id="1" name=""/>
+        <p:cNvGrpSpPr/>
+        <p:nvPr/>
+      </p:nvGrpSpPr>
+      <p:grpSpPr>
+        <a:xfrm>
+          <a:off x="0" y="0"/>
+          <a:ext cx="0" cy="0"/>
+          <a:chOff x="0" y="0"/>
+          <a:chExt cx="0" cy="0"/>
+        </a:xfrm>
+      </p:grpSpPr>
+      <p:sp>
+        <p:nvSpPr>
+          <p:cNvPr id="2" name="Header Placeholder 1"/>
+          <p:cNvSpPr>
+            <a:spLocks noGrp="1"/>
+          </p:cNvSpPr>
+          <p:nvPr>
+            <p:ph type="hdr" sz="quarter"/>
+          </p:nvPr>
+        </p:nvSpPr>
+        <p:spPr>
+          <a:xfrm>
+            <a:off x="0" y="0"/>
+            <a:ext cx="2971800" cy="458788"/>
+          </a:xfrm>
+          <a:prstGeom prst="rect">
+            <a:avLst/>
+          </a:prstGeom>
+        </p:spPr>
+        <p:txBody>
+          <a:bodyPr vert="horz" lIns="91440" tIns="45720" rIns="91440" bIns="45720" rtlCol="0"/>
+          <a:lstStyle>
+            <a:lvl1pPr algn="l">
+              <a:defRPr sz="1200"/>
+            </a:lvl1pPr>
+          </a:lstStyle>
+          <a:p>
+            <a:endParaRPr lang="en-IT"/>
+          </a:p>
+        </p:txBody>
+      </p:sp>
+      <p:sp>
+        <p:nvSpPr>
+          <p:cNvPr id="3" name="Date Placeholder 2"/>
+          <p:cNvSpPr>
+            <a:spLocks noGrp="1"/>
+          </p:cNvSpPr>
+          <p:nvPr>
+            <p:ph type="dt" idx="1"/>
+          </p:nvPr>
+        </p:nvSpPr>
+        <p:spPr>
+          <a:xfrm>
+            <a:off x="3884613" y="0"/>
+            <a:ext cx="2971800" cy="458788"/>
+          </a:xfrm>
+          <a:prstGeom prst="rect">
+            <a:avLst/>
+          </a:prstGeom>
+        </p:spPr>
+        <p:txBody>
+          <a:bodyPr vert="horz" lIns="91440" tIns="45720" rIns="91440" bIns="45720" rtlCol="0"/>
+          <a:lstStyle>
+            <a:lvl1pPr algn="r">
+              <a:defRPr sz="1200"/>
+            </a:lvl1pPr>
+          </a:lstStyle>
+          <a:p>
+            <a:fld id="{200D96AB-166C-0C40-AA95-F65B049874A8}" type="datetimeFigureOut">
+              <a:rPr lang="en-IT" smtClean="0"/>
+              <a:t>05/01/21</a:t>
+            </a:fld>
+            <a:endParaRPr lang="en-IT"/>
+          </a:p>
+        </p:txBody>
+      </p:sp>
+      <p:sp>
+        <p:nvSpPr>
+          <p:cNvPr id="4" name="Slide Image Placeholder 3"/>
+          <p:cNvSpPr>
+            <a:spLocks noGrp="1" noRot="1" noChangeAspect="1"/>
+          </p:cNvSpPr>
+          <p:nvPr>
+            <p:ph type="sldImg" idx="2"/>
+          </p:nvPr>
+        </p:nvSpPr>
+        <p:spPr>
+          <a:xfrm>
+            <a:off x="685800" y="1143000"/>
+            <a:ext cx="5486400" cy="3086100"/>
+          </a:xfrm>
+          <a:prstGeom prst="rect">
+            <a:avLst/>
+          </a:prstGeom>
+          <a:noFill/>
+          <a:ln w="12700">
+            <a:solidFill>
+              <a:prstClr val="black"/>
+            </a:solidFill>
+          </a:ln>
+        </p:spPr>
+        <p:txBody>
+          <a:bodyPr vert="horz" lIns="91440" tIns="45720" rIns="91440" bIns="45720" rtlCol="0" anchor="ctr"/>
+          <a:lstStyle/>
+          <a:p>
+            <a:endParaRPr lang="en-IT"/>
+          </a:p>
+        </p:txBody>
+      </p:sp>
+      <p:sp>
+        <p:nvSpPr>
+          <p:cNvPr id="5" name="Notes Placeholder 4"/>
+          <p:cNvSpPr>
+            <a:spLocks noGrp="1"/>
+          </p:cNvSpPr>
+          <p:nvPr>
+            <p:ph type="body" sz="quarter" idx="3"/>
+          </p:nvPr>
+        </p:nvSpPr>
+        <p:spPr>
+          <a:xfrm>
+            <a:off x="685800" y="4400550"/>
+            <a:ext cx="5486400" cy="3600450"/>
+          </a:xfrm>
+          <a:prstGeom prst="rect">
+            <a:avLst/>
+          </a:prstGeom>
+        </p:spPr>
+        <p:txBody>
+          <a:bodyPr vert="horz" lIns="91440" tIns="45720" rIns="91440" bIns="45720" rtlCol="0"/>
+          <a:lstStyle/>
+          <a:p>
+            <a:pPr lvl="0"/>
+            <a:r>
+              <a:rPr lang="en-GB"/>
+              <a:t>Click to edit Master text styles</a:t>
+            </a:r>
+          </a:p>
+          <a:p>
+            <a:pPr lvl="1"/>
+            <a:r>
+              <a:rPr lang="en-GB"/>
+              <a:t>Second level</a:t>
+            </a:r>
+          </a:p>
+          <a:p>
+            <a:pPr lvl="2"/>
+            <a:r>
+              <a:rPr lang="en-GB"/>
+              <a:t>Third level</a:t>
+            </a:r>
+          </a:p>
+          <a:p>
+            <a:pPr lvl="3"/>
+            <a:r>
+              <a:rPr lang="en-GB"/>
+              <a:t>Fourth level</a:t>
+            </a:r>
+          </a:p>
+          <a:p>
+            <a:pPr lvl="4"/>
+            <a:r>
+              <a:rPr lang="en-GB"/>
+              <a:t>Fifth level</a:t>
+            </a:r>
+            <a:endParaRPr lang="en-IT"/>
+          </a:p>
+        </p:txBody>
+      </p:sp>
+      <p:sp>
+        <p:nvSpPr>
+          <p:cNvPr id="6" name="Footer Placeholder 5"/>
+          <p:cNvSpPr>
+            <a:spLocks noGrp="1"/>
+          </p:cNvSpPr>
+          <p:nvPr>
+            <p:ph type="ftr" sz="quarter" idx="4"/>
+          </p:nvPr>
+        </p:nvSpPr>
+        <p:spPr>
+          <a:xfrm>
+            <a:off x="0" y="8685213"/>
+            <a:ext cx="2971800" cy="458787"/>
+          </a:xfrm>
+          <a:prstGeom prst="rect">
+            <a:avLst/>
+          </a:prstGeom>
+        </p:spPr>
+        <p:txBody>
+          <a:bodyPr vert="horz" lIns="91440" tIns="45720" rIns="91440" bIns="45720" rtlCol="0" anchor="b"/>
+          <a:lstStyle>
+            <a:lvl1pPr algn="l">
+              <a:defRPr sz="1200"/>
+            </a:lvl1pPr>
+          </a:lstStyle>
+          <a:p>
+            <a:endParaRPr lang="en-IT"/>
+          </a:p>
+        </p:txBody>
+      </p:sp>
+      <p:sp>
+        <p:nvSpPr>
+          <p:cNvPr id="7" name="Slide Number Placeholder 6"/>
+          <p:cNvSpPr>
+            <a:spLocks noGrp="1"/>
+          </p:cNvSpPr>
+          <p:nvPr>
+            <p:ph type="sldNum" sz="quarter" idx="5"/>
+          </p:nvPr>
+        </p:nvSpPr>
+        <p:spPr>
+          <a:xfrm>
+            <a:off x="3884613" y="8685213"/>
+            <a:ext cx="2971800" cy="458787"/>
+          </a:xfrm>
+          <a:prstGeom prst="rect">
+            <a:avLst/>
+          </a:prstGeom>
+        </p:spPr>
+        <p:txBody>
+          <a:bodyPr vert="horz" lIns="91440" tIns="45720" rIns="91440" bIns="45720" rtlCol="0" anchor="b"/>
+          <a:lstStyle>
+            <a:lvl1pPr algn="r">
+              <a:defRPr sz="1200"/>
+            </a:lvl1pPr>
+          </a:lstStyle>
+          <a:p>
+            <a:fld id="{C004311A-9E8A-D94D-835D-EA3872E1A58F}" type="slidenum">
+              <a:rPr lang="en-IT" smtClean="0"/>
+              <a:t>‹#›</a:t>
+            </a:fld>
+            <a:endParaRPr lang="en-IT"/>
+          </a:p>
+        </p:txBody>
+      </p:sp>
+    </p:spTree>
+    <p:extLst>
+      <p:ext uri="{BB962C8B-B14F-4D97-AF65-F5344CB8AC3E}">
+        <p14:creationId xmlns:p14="http://schemas.microsoft.com/office/powerpoint/2010/main" val="3206076887"/>
+      </p:ext>
+    </p:extLst>
+  </p:cSld>
+  <p:clrMap bg1="lt1" tx1="dk1" bg2="lt2" tx2="dk2" accent1="accent1" accent2="accent2" accent3="accent3" accent4="accent4" accent5="accent5" accent6="accent6" hlink="hlink" folHlink="folHlink"/>
+  <p:notesStyle>
+    <a:lvl1pPr marL="0" algn="l" defTabSz="914400" rtl="0" eaLnBrk="1" latinLnBrk="0" hangingPunct="1">
+      <a:defRPr sz="1200" kern="1200">
+        <a:solidFill>
+          <a:schemeClr val="tx1"/>
+        </a:solidFill>
+        <a:latin typeface="+mn-lt"/>
+        <a:ea typeface="+mn-ea"/>
+        <a:cs typeface="+mn-cs"/>
+      </a:defRPr>
+    </a:lvl1pPr>
+    <a:lvl2pPr marL="457200" algn="l" defTabSz="914400" rtl="0" eaLnBrk="1" latinLnBrk="0" hangingPunct="1">
+      <a:defRPr sz="1200" kern="1200">
+        <a:solidFill>
+          <a:schemeClr val="tx1"/>
+        </a:solidFill>
+        <a:latin typeface="+mn-lt"/>
+        <a:ea typeface="+mn-ea"/>
+        <a:cs typeface="+mn-cs"/>
+      </a:defRPr>
+    </a:lvl2pPr>
+    <a:lvl3pPr marL="914400" algn="l" defTabSz="914400" rtl="0" eaLnBrk="1" latinLnBrk="0" hangingPunct="1">
+      <a:defRPr sz="1200" kern="1200">
+        <a:solidFill>
+          <a:schemeClr val="tx1"/>
+        </a:solidFill>
+        <a:latin typeface="+mn-lt"/>
+        <a:ea typeface="+mn-ea"/>
+        <a:cs typeface="+mn-cs"/>
+      </a:defRPr>
+    </a:lvl3pPr>
+    <a:lvl4pPr marL="1371600" algn="l" defTabSz="914400" rtl="0" eaLnBrk="1" latinLnBrk="0" hangingPunct="1">
+      <a:defRPr sz="1200" kern="1200">
+        <a:solidFill>
+          <a:schemeClr val="tx1"/>
+        </a:solidFill>
+        <a:latin typeface="+mn-lt"/>
+        <a:ea typeface="+mn-ea"/>
+        <a:cs typeface="+mn-cs"/>
+      </a:defRPr>
+    </a:lvl4pPr>
+    <a:lvl5pPr marL="1828800" algn="l" defTabSz="914400" rtl="0" eaLnBrk="1" latinLnBrk="0" hangingPunct="1">
+      <a:defRPr sz="1200" kern="1200">
+        <a:solidFill>
+          <a:schemeClr val="tx1"/>
+        </a:solidFill>
+        <a:latin typeface="+mn-lt"/>
+        <a:ea typeface="+mn-ea"/>
+        <a:cs typeface="+mn-cs"/>
+      </a:defRPr>
+    </a:lvl5pPr>
+    <a:lvl6pPr marL="2286000" algn="l" defTabSz="914400" rtl="0" eaLnBrk="1" latinLnBrk="0" hangingPunct="1">
+      <a:defRPr sz="1200" kern="1200">
+        <a:solidFill>
+          <a:schemeClr val="tx1"/>
+        </a:solidFill>
+        <a:latin typeface="+mn-lt"/>
+        <a:ea typeface="+mn-ea"/>
+        <a:cs typeface="+mn-cs"/>
+      </a:defRPr>
+    </a:lvl6pPr>
+    <a:lvl7pPr marL="2743200" algn="l" defTabSz="914400" rtl="0" eaLnBrk="1" latinLnBrk="0" hangingPunct="1">
+      <a:defRPr sz="1200" kern="1200">
+        <a:solidFill>
+          <a:schemeClr val="tx1"/>
+        </a:solidFill>
+        <a:latin typeface="+mn-lt"/>
+        <a:ea typeface="+mn-ea"/>
+        <a:cs typeface="+mn-cs"/>
+      </a:defRPr>
+    </a:lvl7pPr>
+    <a:lvl8pPr marL="3200400" algn="l" defTabSz="914400" rtl="0" eaLnBrk="1" latinLnBrk="0" hangingPunct="1">
+      <a:defRPr sz="1200" kern="1200">
+        <a:solidFill>
+          <a:schemeClr val="tx1"/>
+        </a:solidFill>
+        <a:latin typeface="+mn-lt"/>
+        <a:ea typeface="+mn-ea"/>
+        <a:cs typeface="+mn-cs"/>
+      </a:defRPr>
+    </a:lvl8pPr>
+    <a:lvl9pPr marL="3657600" algn="l" defTabSz="914400" rtl="0" eaLnBrk="1" latinLnBrk="0" hangingPunct="1">
+      <a:defRPr sz="1200" kern="1200">
+        <a:solidFill>
+          <a:schemeClr val="tx1"/>
+        </a:solidFill>
+        <a:latin typeface="+mn-lt"/>
+        <a:ea typeface="+mn-ea"/>
+        <a:cs typeface="+mn-cs"/>
+      </a:defRPr>
+    </a:lvl9pPr>
+  </p:notesStyle>
+</p:notesMaster>
+</file>
+
+<file path=ppt/notesSlides/notesSlide1.xml><?xml version="1.0" encoding="utf-8"?>
+<p:notes xmlns:a="http://schemas.openxmlformats.org/drawingml/2006/main" xmlns:r="http://schemas.openxmlformats.org/officeDocument/2006/relationships" xmlns:p="http://schemas.openxmlformats.org/presentationml/2006/main">
+  <p:cSld>
+    <p:spTree>
+      <p:nvGrpSpPr>
+        <p:cNvPr id="1" name=""/>
+        <p:cNvGrpSpPr/>
+        <p:nvPr/>
+      </p:nvGrpSpPr>
+      <p:grpSpPr>
+        <a:xfrm>
+          <a:off x="0" y="0"/>
+          <a:ext cx="0" cy="0"/>
+          <a:chOff x="0" y="0"/>
+          <a:chExt cx="0" cy="0"/>
+        </a:xfrm>
+      </p:grpSpPr>
+      <p:sp>
+        <p:nvSpPr>
+          <p:cNvPr id="2" name="Slide Image Placeholder 1"/>
+          <p:cNvSpPr>
+            <a:spLocks noGrp="1" noRot="1" noChangeAspect="1"/>
+          </p:cNvSpPr>
+          <p:nvPr>
+            <p:ph type="sldImg"/>
+          </p:nvPr>
+        </p:nvSpPr>
+        <p:spPr/>
+      </p:sp>
+      <p:sp>
+        <p:nvSpPr>
+          <p:cNvPr id="3" name="Notes Placeholder 2"/>
+          <p:cNvSpPr>
+            <a:spLocks noGrp="1"/>
+          </p:cNvSpPr>
+          <p:nvPr>
+            <p:ph type="body" idx="1"/>
+          </p:nvPr>
+        </p:nvSpPr>
+        <p:spPr/>
+        <p:txBody>
+          <a:bodyPr/>
+          <a:lstStyle/>
+          <a:p>
+            <a:endParaRPr lang="en-IT" dirty="0"/>
+          </a:p>
+        </p:txBody>
+      </p:sp>
+      <p:sp>
+        <p:nvSpPr>
+          <p:cNvPr id="4" name="Slide Number Placeholder 3"/>
+          <p:cNvSpPr>
+            <a:spLocks noGrp="1"/>
+          </p:cNvSpPr>
+          <p:nvPr>
+            <p:ph type="sldNum" sz="quarter" idx="5"/>
+          </p:nvPr>
+        </p:nvSpPr>
+        <p:spPr/>
+        <p:txBody>
+          <a:bodyPr/>
+          <a:lstStyle/>
+          <a:p>
+            <a:fld id="{C004311A-9E8A-D94D-835D-EA3872E1A58F}" type="slidenum">
+              <a:rPr lang="en-IT" smtClean="0"/>
+              <a:t>1</a:t>
+            </a:fld>
+            <a:endParaRPr lang="en-IT"/>
+          </a:p>
+        </p:txBody>
+      </p:sp>
+    </p:spTree>
+    <p:extLst>
+      <p:ext uri="{BB962C8B-B14F-4D97-AF65-F5344CB8AC3E}">
+        <p14:creationId xmlns:p14="http://schemas.microsoft.com/office/powerpoint/2010/main" val="1487935738"/>
+      </p:ext>
+    </p:extLst>
+  </p:cSld>
+  <p:clrMapOvr>
+    <a:masterClrMapping/>
+  </p:clrMapOvr>
+</p:notes>
 </file>
 
 <file path=ppt/slideLayouts/slideLayout1.xml><?xml version="1.0" encoding="utf-8"?>
@@ -257,7 +699,7 @@
           <a:p>
             <a:fld id="{6C501815-BB34-A14B-8F76-37AD9B275987}" type="datetimeFigureOut">
               <a:rPr lang="en-IT" smtClean="0"/>
-              <a:t>03/01/21</a:t>
+              <a:t>05/01/21</a:t>
             </a:fld>
             <a:endParaRPr lang="en-IT"/>
           </a:p>
@@ -457,7 +899,7 @@
           <a:p>
             <a:fld id="{6C501815-BB34-A14B-8F76-37AD9B275987}" type="datetimeFigureOut">
               <a:rPr lang="en-IT" smtClean="0"/>
-              <a:t>03/01/21</a:t>
+              <a:t>05/01/21</a:t>
             </a:fld>
             <a:endParaRPr lang="en-IT"/>
           </a:p>
@@ -667,7 +1109,7 @@
           <a:p>
             <a:fld id="{6C501815-BB34-A14B-8F76-37AD9B275987}" type="datetimeFigureOut">
               <a:rPr lang="en-IT" smtClean="0"/>
-              <a:t>03/01/21</a:t>
+              <a:t>05/01/21</a:t>
             </a:fld>
             <a:endParaRPr lang="en-IT"/>
           </a:p>
@@ -867,7 +1309,7 @@
           <a:p>
             <a:fld id="{6C501815-BB34-A14B-8F76-37AD9B275987}" type="datetimeFigureOut">
               <a:rPr lang="en-IT" smtClean="0"/>
-              <a:t>03/01/21</a:t>
+              <a:t>05/01/21</a:t>
             </a:fld>
             <a:endParaRPr lang="en-IT"/>
           </a:p>
@@ -1143,7 +1585,7 @@
           <a:p>
             <a:fld id="{6C501815-BB34-A14B-8F76-37AD9B275987}" type="datetimeFigureOut">
               <a:rPr lang="en-IT" smtClean="0"/>
-              <a:t>03/01/21</a:t>
+              <a:t>05/01/21</a:t>
             </a:fld>
             <a:endParaRPr lang="en-IT"/>
           </a:p>
@@ -1411,7 +1853,7 @@
           <a:p>
             <a:fld id="{6C501815-BB34-A14B-8F76-37AD9B275987}" type="datetimeFigureOut">
               <a:rPr lang="en-IT" smtClean="0"/>
-              <a:t>03/01/21</a:t>
+              <a:t>05/01/21</a:t>
             </a:fld>
             <a:endParaRPr lang="en-IT"/>
           </a:p>
@@ -1826,7 +2268,7 @@
           <a:p>
             <a:fld id="{6C501815-BB34-A14B-8F76-37AD9B275987}" type="datetimeFigureOut">
               <a:rPr lang="en-IT" smtClean="0"/>
-              <a:t>03/01/21</a:t>
+              <a:t>05/01/21</a:t>
             </a:fld>
             <a:endParaRPr lang="en-IT"/>
           </a:p>
@@ -1968,7 +2410,7 @@
           <a:p>
             <a:fld id="{6C501815-BB34-A14B-8F76-37AD9B275987}" type="datetimeFigureOut">
               <a:rPr lang="en-IT" smtClean="0"/>
-              <a:t>03/01/21</a:t>
+              <a:t>05/01/21</a:t>
             </a:fld>
             <a:endParaRPr lang="en-IT"/>
           </a:p>
@@ -2081,7 +2523,7 @@
           <a:p>
             <a:fld id="{6C501815-BB34-A14B-8F76-37AD9B275987}" type="datetimeFigureOut">
               <a:rPr lang="en-IT" smtClean="0"/>
-              <a:t>03/01/21</a:t>
+              <a:t>05/01/21</a:t>
             </a:fld>
             <a:endParaRPr lang="en-IT"/>
           </a:p>
@@ -2394,7 +2836,7 @@
           <a:p>
             <a:fld id="{6C501815-BB34-A14B-8F76-37AD9B275987}" type="datetimeFigureOut">
               <a:rPr lang="en-IT" smtClean="0"/>
-              <a:t>03/01/21</a:t>
+              <a:t>05/01/21</a:t>
             </a:fld>
             <a:endParaRPr lang="en-IT"/>
           </a:p>
@@ -2683,7 +3125,7 @@
           <a:p>
             <a:fld id="{6C501815-BB34-A14B-8F76-37AD9B275987}" type="datetimeFigureOut">
               <a:rPr lang="en-IT" smtClean="0"/>
-              <a:t>03/01/21</a:t>
+              <a:t>05/01/21</a:t>
             </a:fld>
             <a:endParaRPr lang="en-IT"/>
           </a:p>
@@ -2926,7 +3368,7 @@
           <a:p>
             <a:fld id="{6C501815-BB34-A14B-8F76-37AD9B275987}" type="datetimeFigureOut">
               <a:rPr lang="en-IT" smtClean="0"/>
-              <a:t>03/01/21</a:t>
+              <a:t>05/01/21</a:t>
             </a:fld>
             <a:endParaRPr lang="en-IT"/>
           </a:p>
@@ -3358,10 +3800,10 @@
           <p:nvPr/>
         </p:nvPicPr>
         <p:blipFill>
-          <a:blip r:embed="rId2">
+          <a:blip r:embed="rId3">
             <a:extLst>
               <a:ext uri="{96DAC541-7B7A-43D3-8B79-37D633B846F1}">
-                <asvg:svgBlip xmlns:asvg="http://schemas.microsoft.com/office/drawing/2016/SVG/main" r:embed="rId3"/>
+                <asvg:svgBlip xmlns:asvg="http://schemas.microsoft.com/office/drawing/2016/SVG/main" r:embed="rId4"/>
               </a:ext>
             </a:extLst>
           </a:blip>
@@ -3371,7 +3813,7 @@
         </p:blipFill>
         <p:spPr>
           <a:xfrm>
-            <a:off x="559193" y="1052988"/>
+            <a:off x="296311" y="1010012"/>
             <a:ext cx="651407" cy="651407"/>
           </a:xfrm>
           <a:prstGeom prst="rect">
@@ -3393,7 +3835,7 @@
         </p:nvSpPr>
         <p:spPr>
           <a:xfrm>
-            <a:off x="361128" y="1669222"/>
+            <a:off x="98246" y="1626246"/>
             <a:ext cx="1368544" cy="276999"/>
           </a:xfrm>
           <a:prstGeom prst="rect">
@@ -3429,10 +3871,10 @@
           <p:nvPr/>
         </p:nvPicPr>
         <p:blipFill>
-          <a:blip r:embed="rId4">
+          <a:blip r:embed="rId5">
             <a:extLst>
               <a:ext uri="{96DAC541-7B7A-43D3-8B79-37D633B846F1}">
-                <asvg:svgBlip xmlns:asvg="http://schemas.microsoft.com/office/drawing/2016/SVG/main" r:embed="rId5"/>
+                <asvg:svgBlip xmlns:asvg="http://schemas.microsoft.com/office/drawing/2016/SVG/main" r:embed="rId6"/>
               </a:ext>
             </a:extLst>
           </a:blip>
@@ -3442,7 +3884,7 @@
         </p:blipFill>
         <p:spPr>
           <a:xfrm>
-            <a:off x="511760" y="2780812"/>
+            <a:off x="255213" y="2760672"/>
             <a:ext cx="817861" cy="817861"/>
           </a:xfrm>
           <a:prstGeom prst="rect">
@@ -3464,7 +3906,7 @@
         </p:nvSpPr>
         <p:spPr>
           <a:xfrm>
-            <a:off x="511760" y="3542427"/>
+            <a:off x="255213" y="3522287"/>
             <a:ext cx="1027525" cy="307777"/>
           </a:xfrm>
           <a:prstGeom prst="rect">
@@ -3500,10 +3942,10 @@
           <p:nvPr/>
         </p:nvPicPr>
         <p:blipFill>
-          <a:blip r:embed="rId6">
+          <a:blip r:embed="rId7">
             <a:extLst>
               <a:ext uri="{96DAC541-7B7A-43D3-8B79-37D633B846F1}">
-                <asvg:svgBlip xmlns:asvg="http://schemas.microsoft.com/office/drawing/2016/SVG/main" r:embed="rId7"/>
+                <asvg:svgBlip xmlns:asvg="http://schemas.microsoft.com/office/drawing/2016/SVG/main" r:embed="rId8"/>
               </a:ext>
             </a:extLst>
           </a:blip>
@@ -3513,7 +3955,7 @@
         </p:blipFill>
         <p:spPr>
           <a:xfrm>
-            <a:off x="1993503" y="1052989"/>
+            <a:off x="1625827" y="1017978"/>
             <a:ext cx="651407" cy="651407"/>
           </a:xfrm>
           <a:prstGeom prst="rect">
@@ -3536,10 +3978,10 @@
           <p:nvPr/>
         </p:nvPicPr>
         <p:blipFill>
-          <a:blip r:embed="rId8">
+          <a:blip r:embed="rId9">
             <a:extLst>
               <a:ext uri="{96DAC541-7B7A-43D3-8B79-37D633B846F1}">
-                <asvg:svgBlip xmlns:asvg="http://schemas.microsoft.com/office/drawing/2016/SVG/main" r:embed="rId9"/>
+                <asvg:svgBlip xmlns:asvg="http://schemas.microsoft.com/office/drawing/2016/SVG/main" r:embed="rId10"/>
               </a:ext>
             </a:extLst>
           </a:blip>
@@ -3549,7 +3991,7 @@
         </p:blipFill>
         <p:spPr>
           <a:xfrm>
-            <a:off x="1964357" y="2816911"/>
+            <a:off x="1707810" y="2796771"/>
             <a:ext cx="745665" cy="745665"/>
           </a:xfrm>
           <a:prstGeom prst="rect">
@@ -3572,10 +4014,10 @@
           <p:nvPr/>
         </p:nvPicPr>
         <p:blipFill>
-          <a:blip r:embed="rId10">
+          <a:blip r:embed="rId11">
             <a:extLst>
               <a:ext uri="{96DAC541-7B7A-43D3-8B79-37D633B846F1}">
-                <asvg:svgBlip xmlns:asvg="http://schemas.microsoft.com/office/drawing/2016/SVG/main" r:embed="rId11"/>
+                <asvg:svgBlip xmlns:asvg="http://schemas.microsoft.com/office/drawing/2016/SVG/main" r:embed="rId12"/>
               </a:ext>
             </a:extLst>
           </a:blip>
@@ -3585,38 +4027,8 @@
         </p:blipFill>
         <p:spPr>
           <a:xfrm>
-            <a:off x="10952591" y="1093769"/>
+            <a:off x="11449878" y="1999480"/>
             <a:ext cx="742122" cy="742122"/>
-          </a:xfrm>
-          <a:prstGeom prst="rect">
-            <a:avLst/>
-          </a:prstGeom>
-        </p:spPr>
-      </p:pic>
-      <p:pic>
-        <p:nvPicPr>
-          <p:cNvPr id="22" name="Picture 21">
-            <a:extLst>
-              <a:ext uri="{FF2B5EF4-FFF2-40B4-BE49-F238E27FC236}">
-                <a16:creationId xmlns:a16="http://schemas.microsoft.com/office/drawing/2014/main" id="{7D9FF795-632B-C34A-A12B-384ECDD2E265}"/>
-              </a:ext>
-            </a:extLst>
-          </p:cNvPr>
-          <p:cNvPicPr>
-            <a:picLocks noChangeAspect="1"/>
-          </p:cNvPicPr>
-          <p:nvPr/>
-        </p:nvPicPr>
-        <p:blipFill>
-          <a:blip r:embed="rId12"/>
-          <a:stretch>
-            <a:fillRect/>
-          </a:stretch>
-        </p:blipFill>
-        <p:spPr>
-          <a:xfrm>
-            <a:off x="7065199" y="858587"/>
-            <a:ext cx="669390" cy="1037223"/>
           </a:xfrm>
           <a:prstGeom prst="rect">
             <a:avLst/>
@@ -3651,7 +4063,7 @@
         </p:blipFill>
         <p:spPr>
           <a:xfrm>
-            <a:off x="8663266" y="921491"/>
+            <a:off x="9160553" y="1827202"/>
             <a:ext cx="914400" cy="914400"/>
           </a:xfrm>
           <a:prstGeom prst="rect">
@@ -3681,7 +4093,7 @@
         </p:blipFill>
         <p:spPr>
           <a:xfrm>
-            <a:off x="10506344" y="921491"/>
+            <a:off x="11003631" y="1827202"/>
             <a:ext cx="587266" cy="914400"/>
           </a:xfrm>
           <a:prstGeom prst="rect">
@@ -3707,8 +4119,8 @@
         </p:nvCxnSpPr>
         <p:spPr>
           <a:xfrm>
-            <a:off x="1210600" y="1378692"/>
-            <a:ext cx="782903" cy="1"/>
+            <a:off x="947718" y="1335716"/>
+            <a:ext cx="678109" cy="7966"/>
           </a:xfrm>
           <a:prstGeom prst="straightConnector1">
             <a:avLst/>
@@ -3750,9 +4162,9 @@
           <p:nvPr/>
         </p:nvCxnSpPr>
         <p:spPr>
-          <a:xfrm flipV="1">
-            <a:off x="2644910" y="1378691"/>
-            <a:ext cx="797226" cy="2"/>
+          <a:xfrm>
+            <a:off x="2277234" y="1343682"/>
+            <a:ext cx="656298" cy="146"/>
           </a:xfrm>
           <a:prstGeom prst="straightConnector1">
             <a:avLst/>
@@ -3805,7 +4217,7 @@
         </p:blipFill>
         <p:spPr>
           <a:xfrm>
-            <a:off x="5142669" y="921491"/>
+            <a:off x="4479782" y="886628"/>
             <a:ext cx="914400" cy="914400"/>
           </a:xfrm>
           <a:prstGeom prst="rect">
@@ -3841,8 +4253,8 @@
         </p:blipFill>
         <p:spPr>
           <a:xfrm>
-            <a:off x="3442136" y="921491"/>
-            <a:ext cx="914400" cy="914400"/>
+            <a:off x="2933532" y="952376"/>
+            <a:ext cx="782904" cy="782904"/>
           </a:xfrm>
           <a:prstGeom prst="rect">
             <a:avLst/>
@@ -3867,7 +4279,7 @@
         </p:nvCxnSpPr>
         <p:spPr>
           <a:xfrm>
-            <a:off x="1329621" y="3189743"/>
+            <a:off x="1073074" y="3169603"/>
             <a:ext cx="634736" cy="1"/>
           </a:xfrm>
           <a:prstGeom prst="straightConnector1">
@@ -3911,8 +4323,8 @@
         </p:nvCxnSpPr>
         <p:spPr>
           <a:xfrm flipV="1">
-            <a:off x="2710022" y="3189742"/>
-            <a:ext cx="2478717" cy="2"/>
+            <a:off x="2453475" y="3146766"/>
+            <a:ext cx="2162146" cy="22838"/>
           </a:xfrm>
           <a:prstGeom prst="straightConnector1">
             <a:avLst/>
@@ -3955,52 +4367,8 @@
         </p:nvCxnSpPr>
         <p:spPr>
           <a:xfrm>
-            <a:off x="4356536" y="1378691"/>
-            <a:ext cx="786133" cy="0"/>
-          </a:xfrm>
-          <a:prstGeom prst="straightConnector1">
-            <a:avLst/>
-          </a:prstGeom>
-          <a:ln w="12700">
-            <a:headEnd type="triangle"/>
-            <a:tailEnd type="triangle"/>
-          </a:ln>
-        </p:spPr>
-        <p:style>
-          <a:lnRef idx="1">
-            <a:schemeClr val="accent1"/>
-          </a:lnRef>
-          <a:fillRef idx="0">
-            <a:schemeClr val="accent1"/>
-          </a:fillRef>
-          <a:effectRef idx="0">
-            <a:schemeClr val="accent1"/>
-          </a:effectRef>
-          <a:fontRef idx="minor">
-            <a:schemeClr val="tx1"/>
-          </a:fontRef>
-        </p:style>
-      </p:cxnSp>
-      <p:cxnSp>
-        <p:nvCxnSpPr>
-          <p:cNvPr id="70" name="Straight Arrow Connector 69">
-            <a:extLst>
-              <a:ext uri="{FF2B5EF4-FFF2-40B4-BE49-F238E27FC236}">
-                <a16:creationId xmlns:a16="http://schemas.microsoft.com/office/drawing/2014/main" id="{10CB5039-8053-D648-A44B-F1A7F6AD422B}"/>
-              </a:ext>
-            </a:extLst>
-          </p:cNvPr>
-          <p:cNvCxnSpPr>
-            <a:cxnSpLocks/>
-            <a:stCxn id="44" idx="3"/>
-            <a:endCxn id="22" idx="1"/>
-          </p:cNvCxnSpPr>
-          <p:nvPr/>
-        </p:nvCxnSpPr>
-        <p:spPr>
-          <a:xfrm flipV="1">
-            <a:off x="6057069" y="1377199"/>
-            <a:ext cx="1008130" cy="1492"/>
+            <a:off x="3716436" y="1343828"/>
+            <a:ext cx="763346" cy="0"/>
           </a:xfrm>
           <a:prstGeom prst="straightConnector1">
             <a:avLst/>
@@ -4036,15 +4404,15 @@
           </p:cNvPr>
           <p:cNvCxnSpPr>
             <a:cxnSpLocks/>
-            <a:stCxn id="22" idx="3"/>
+            <a:stCxn id="1026" idx="3"/>
             <a:endCxn id="23" idx="1"/>
           </p:cNvCxnSpPr>
           <p:nvPr/>
         </p:nvCxnSpPr>
         <p:spPr>
-          <a:xfrm>
-            <a:off x="7734589" y="1377199"/>
-            <a:ext cx="928677" cy="1492"/>
+          <a:xfrm flipV="1">
+            <a:off x="8329430" y="2284402"/>
+            <a:ext cx="831123" cy="2220"/>
           </a:xfrm>
           <a:prstGeom prst="straightConnector1">
             <a:avLst/>
@@ -4087,7 +4455,7 @@
         </p:nvCxnSpPr>
         <p:spPr>
           <a:xfrm>
-            <a:off x="9577666" y="1378691"/>
+            <a:off x="10074953" y="2284402"/>
             <a:ext cx="928678" cy="0"/>
           </a:xfrm>
           <a:prstGeom prst="straightConnector1">
@@ -4127,7 +4495,7 @@
         </p:nvSpPr>
         <p:spPr>
           <a:xfrm>
-            <a:off x="1878223" y="1709156"/>
+            <a:off x="1510547" y="1674145"/>
             <a:ext cx="910827" cy="276999"/>
           </a:xfrm>
           <a:prstGeom prst="rect">
@@ -4162,7 +4530,7 @@
         </p:nvSpPr>
         <p:spPr>
           <a:xfrm>
-            <a:off x="2146726" y="3508144"/>
+            <a:off x="1890179" y="3488004"/>
             <a:ext cx="373820" cy="307777"/>
           </a:xfrm>
           <a:prstGeom prst="rect">
@@ -4197,8 +4565,8 @@
         </p:nvSpPr>
         <p:spPr>
           <a:xfrm>
-            <a:off x="3376815" y="1651225"/>
-            <a:ext cx="945067" cy="369332"/>
+            <a:off x="2935967" y="1632158"/>
+            <a:ext cx="778034" cy="307777"/>
           </a:xfrm>
           <a:prstGeom prst="rect">
             <a:avLst/>
@@ -4212,7 +4580,7 @@
           <a:lstStyle/>
           <a:p>
             <a:r>
-              <a:rPr lang="en-IT" dirty="0"/>
+              <a:rPr lang="en-IT" sz="1400" dirty="0"/>
               <a:t>Internet</a:t>
             </a:r>
           </a:p>
@@ -4232,7 +4600,7 @@
         </p:nvSpPr>
         <p:spPr>
           <a:xfrm>
-            <a:off x="5119108" y="1837846"/>
+            <a:off x="4456221" y="1802983"/>
             <a:ext cx="753283" cy="307777"/>
           </a:xfrm>
           <a:prstGeom prst="rect">
@@ -4267,7 +4635,7 @@
         </p:nvSpPr>
         <p:spPr>
           <a:xfrm>
-            <a:off x="6837432" y="1918438"/>
+            <a:off x="7331527" y="2645752"/>
             <a:ext cx="1324850" cy="276999"/>
           </a:xfrm>
           <a:prstGeom prst="rect">
@@ -4302,7 +4670,7 @@
         </p:nvSpPr>
         <p:spPr>
           <a:xfrm>
-            <a:off x="8634103" y="1821058"/>
+            <a:off x="9131390" y="2726769"/>
             <a:ext cx="753283" cy="307777"/>
           </a:xfrm>
           <a:prstGeom prst="rect">
@@ -4337,7 +4705,7 @@
         </p:nvSpPr>
         <p:spPr>
           <a:xfrm>
-            <a:off x="10485292" y="1867224"/>
+            <a:off x="10982579" y="2772935"/>
             <a:ext cx="1047082" cy="276999"/>
           </a:xfrm>
           <a:prstGeom prst="rect">
@@ -4372,7 +4740,7 @@
         </p:nvSpPr>
         <p:spPr>
           <a:xfrm>
-            <a:off x="4976564" y="2582279"/>
+            <a:off x="4403446" y="2539303"/>
             <a:ext cx="1008131" cy="553998"/>
           </a:xfrm>
           <a:prstGeom prst="rect">
@@ -4419,7 +4787,7 @@
         </p:blipFill>
         <p:spPr>
           <a:xfrm>
-            <a:off x="5188739" y="2894650"/>
+            <a:off x="4615621" y="2851674"/>
             <a:ext cx="583782" cy="590183"/>
           </a:xfrm>
           <a:prstGeom prst="rect">
@@ -4442,10 +4810,10 @@
           <p:nvPr/>
         </p:nvPicPr>
         <p:blipFill>
-          <a:blip r:embed="rId2">
+          <a:blip r:embed="rId3">
             <a:extLst>
               <a:ext uri="{96DAC541-7B7A-43D3-8B79-37D633B846F1}">
-                <asvg:svgBlip xmlns:asvg="http://schemas.microsoft.com/office/drawing/2016/SVG/main" r:embed="rId3"/>
+                <asvg:svgBlip xmlns:asvg="http://schemas.microsoft.com/office/drawing/2016/SVG/main" r:embed="rId4"/>
               </a:ext>
             </a:extLst>
           </a:blip>
@@ -4455,7 +4823,7 @@
         </p:blipFill>
         <p:spPr>
           <a:xfrm>
-            <a:off x="559716" y="4572022"/>
+            <a:off x="296834" y="4529046"/>
             <a:ext cx="651407" cy="651407"/>
           </a:xfrm>
           <a:prstGeom prst="rect">
@@ -4477,7 +4845,7 @@
         </p:nvSpPr>
         <p:spPr>
           <a:xfrm>
-            <a:off x="361128" y="5147552"/>
+            <a:off x="98246" y="5104576"/>
             <a:ext cx="1133644" cy="276999"/>
           </a:xfrm>
           <a:prstGeom prst="rect">
@@ -4520,7 +4888,7 @@
         </p:blipFill>
         <p:spPr>
           <a:xfrm>
-            <a:off x="2041460" y="4358931"/>
+            <a:off x="1778578" y="4315955"/>
             <a:ext cx="668562" cy="1077589"/>
           </a:xfrm>
           <a:prstGeom prst="rect">
@@ -4542,7 +4910,7 @@
         </p:nvSpPr>
         <p:spPr>
           <a:xfrm>
-            <a:off x="1614617" y="5436519"/>
+            <a:off x="1351735" y="5393543"/>
             <a:ext cx="1778692" cy="276999"/>
           </a:xfrm>
           <a:prstGeom prst="rect">
@@ -4581,7 +4949,7 @@
         </p:nvCxnSpPr>
         <p:spPr>
           <a:xfrm>
-            <a:off x="1211123" y="4897726"/>
+            <a:off x="948241" y="4854750"/>
             <a:ext cx="830337" cy="0"/>
           </a:xfrm>
           <a:prstGeom prst="straightConnector1">
@@ -4629,7 +4997,7 @@
         </p:blipFill>
         <p:spPr>
           <a:xfrm>
-            <a:off x="5055973" y="4262251"/>
+            <a:off x="4482855" y="4219275"/>
             <a:ext cx="849313" cy="885301"/>
           </a:xfrm>
           <a:prstGeom prst="rect">
@@ -4651,7 +5019,7 @@
         </p:nvSpPr>
         <p:spPr>
           <a:xfrm>
-            <a:off x="4753326" y="5109500"/>
+            <a:off x="4180208" y="5066524"/>
             <a:ext cx="1375569" cy="276999"/>
           </a:xfrm>
           <a:prstGeom prst="rect">
@@ -4690,54 +5058,10 @@
         </p:nvCxnSpPr>
         <p:spPr>
           <a:xfrm>
-            <a:off x="5480630" y="3484833"/>
+            <a:off x="4907512" y="3441857"/>
             <a:ext cx="0" cy="777418"/>
           </a:xfrm>
           <a:prstGeom prst="straightConnector1">
-            <a:avLst/>
-          </a:prstGeom>
-          <a:ln w="12700">
-            <a:headEnd type="triangle"/>
-            <a:tailEnd type="triangle"/>
-          </a:ln>
-        </p:spPr>
-        <p:style>
-          <a:lnRef idx="1">
-            <a:schemeClr val="accent1"/>
-          </a:lnRef>
-          <a:fillRef idx="0">
-            <a:schemeClr val="accent1"/>
-          </a:fillRef>
-          <a:effectRef idx="0">
-            <a:schemeClr val="accent1"/>
-          </a:effectRef>
-          <a:fontRef idx="minor">
-            <a:schemeClr val="tx1"/>
-          </a:fontRef>
-        </p:style>
-      </p:cxnSp>
-      <p:cxnSp>
-        <p:nvCxnSpPr>
-          <p:cNvPr id="143" name="Elbow Connector 142">
-            <a:extLst>
-              <a:ext uri="{FF2B5EF4-FFF2-40B4-BE49-F238E27FC236}">
-                <a16:creationId xmlns:a16="http://schemas.microsoft.com/office/drawing/2014/main" id="{4D11E457-4A10-2546-8A39-A2F3B97F638E}"/>
-              </a:ext>
-            </a:extLst>
-          </p:cNvPr>
-          <p:cNvCxnSpPr>
-            <a:cxnSpLocks/>
-            <a:stCxn id="109" idx="3"/>
-            <a:endCxn id="99" idx="2"/>
-          </p:cNvCxnSpPr>
-          <p:nvPr/>
-        </p:nvCxnSpPr>
-        <p:spPr>
-          <a:xfrm flipV="1">
-            <a:off x="5772521" y="2195437"/>
-            <a:ext cx="1727336" cy="994305"/>
-          </a:xfrm>
-          <a:prstGeom prst="bentConnector2">
             <a:avLst/>
           </a:prstGeom>
           <a:ln w="12700">
@@ -4778,8 +5102,8 @@
         </p:nvCxnSpPr>
         <p:spPr>
           <a:xfrm flipV="1">
-            <a:off x="2710022" y="3189742"/>
-            <a:ext cx="2478717" cy="1707984"/>
+            <a:off x="2447140" y="3146766"/>
+            <a:ext cx="2168481" cy="1707984"/>
           </a:xfrm>
           <a:prstGeom prst="straightConnector1">
             <a:avLst/>
@@ -4813,13 +5137,15 @@
               </a:ext>
             </a:extLst>
           </p:cNvPr>
-          <p:cNvCxnSpPr/>
+          <p:cNvCxnSpPr>
+            <a:cxnSpLocks/>
+          </p:cNvCxnSpPr>
           <p:nvPr/>
         </p:nvCxnSpPr>
         <p:spPr>
           <a:xfrm>
-            <a:off x="455674" y="6113418"/>
-            <a:ext cx="11058041" cy="0"/>
+            <a:off x="152483" y="6113418"/>
+            <a:ext cx="11943692" cy="0"/>
           </a:xfrm>
           <a:prstGeom prst="line">
             <a:avLst/>
@@ -4855,7 +5181,7 @@
         </p:nvCxnSpPr>
         <p:spPr>
           <a:xfrm flipV="1">
-            <a:off x="455674" y="5956663"/>
+            <a:off x="163483" y="5956663"/>
             <a:ext cx="0" cy="156755"/>
           </a:xfrm>
           <a:prstGeom prst="line">
@@ -4892,7 +5218,7 @@
         </p:nvCxnSpPr>
         <p:spPr>
           <a:xfrm flipV="1">
-            <a:off x="6381857" y="5956663"/>
+            <a:off x="5867723" y="5956662"/>
             <a:ext cx="0" cy="156755"/>
           </a:xfrm>
           <a:prstGeom prst="line">
@@ -4924,12 +5250,14 @@
               </a:ext>
             </a:extLst>
           </p:cNvPr>
-          <p:cNvCxnSpPr/>
+          <p:cNvCxnSpPr>
+            <a:cxnSpLocks/>
+          </p:cNvCxnSpPr>
           <p:nvPr/>
         </p:nvCxnSpPr>
         <p:spPr>
-          <a:xfrm flipV="1">
-            <a:off x="11513715" y="5956663"/>
+          <a:xfrm>
+            <a:off x="12096175" y="5956662"/>
             <a:ext cx="0" cy="156755"/>
           </a:xfrm>
           <a:prstGeom prst="line">
@@ -4966,7 +5294,7 @@
         </p:nvCxnSpPr>
         <p:spPr>
           <a:xfrm flipV="1">
-            <a:off x="9241816" y="5956663"/>
+            <a:off x="8954551" y="5956662"/>
             <a:ext cx="0" cy="156755"/>
           </a:xfrm>
           <a:prstGeom prst="line">
@@ -5039,7 +5367,7 @@
         </p:nvSpPr>
         <p:spPr>
           <a:xfrm>
-            <a:off x="6743380" y="6137072"/>
+            <a:off x="6321898" y="6128905"/>
             <a:ext cx="2331151" cy="369332"/>
           </a:xfrm>
           <a:prstGeom prst="rect">
@@ -5075,7 +5403,7 @@
         </p:nvSpPr>
         <p:spPr>
           <a:xfrm>
-            <a:off x="9387386" y="6128806"/>
+            <a:off x="9715257" y="6095557"/>
             <a:ext cx="1850956" cy="369332"/>
           </a:xfrm>
           <a:prstGeom prst="rect">
@@ -5094,6 +5422,403 @@
               <a:t>Data Access Layer</a:t>
             </a:r>
             <a:endParaRPr lang="en-IT" dirty="0"/>
+          </a:p>
+        </p:txBody>
+      </p:sp>
+      <p:pic>
+        <p:nvPicPr>
+          <p:cNvPr id="3" name="Picture 2" descr="Icon&#10;&#10;Description automatically generated">
+            <a:extLst>
+              <a:ext uri="{FF2B5EF4-FFF2-40B4-BE49-F238E27FC236}">
+                <a16:creationId xmlns:a16="http://schemas.microsoft.com/office/drawing/2014/main" id="{03E838BC-4755-5C45-A679-E593BFBF5009}"/>
+              </a:ext>
+            </a:extLst>
+          </p:cNvPr>
+          <p:cNvPicPr>
+            <a:picLocks noChangeAspect="1"/>
+          </p:cNvPicPr>
+          <p:nvPr/>
+        </p:nvPicPr>
+        <p:blipFill>
+          <a:blip r:embed="rId21">
+            <a:extLst>
+              <a:ext uri="{837473B0-CC2E-450A-ABE3-18F120FF3D39}">
+                <a1611:picAttrSrcUrl xmlns:a1611="http://schemas.microsoft.com/office/drawing/2016/11/main" r:id="rId22"/>
+              </a:ext>
+            </a:extLst>
+          </a:blip>
+          <a:stretch>
+            <a:fillRect/>
+          </a:stretch>
+        </p:blipFill>
+        <p:spPr>
+          <a:xfrm>
+            <a:off x="6427569" y="2026688"/>
+            <a:ext cx="515428" cy="515428"/>
+          </a:xfrm>
+          <a:prstGeom prst="rect">
+            <a:avLst/>
+          </a:prstGeom>
+        </p:spPr>
+      </p:pic>
+      <p:cxnSp>
+        <p:nvCxnSpPr>
+          <p:cNvPr id="54" name="Straight Arrow Connector 53">
+            <a:extLst>
+              <a:ext uri="{FF2B5EF4-FFF2-40B4-BE49-F238E27FC236}">
+                <a16:creationId xmlns:a16="http://schemas.microsoft.com/office/drawing/2014/main" id="{D6A39A11-E2E5-844B-B326-EB9966C66B17}"/>
+              </a:ext>
+            </a:extLst>
+          </p:cNvPr>
+          <p:cNvCxnSpPr>
+            <a:cxnSpLocks/>
+            <a:stCxn id="3" idx="3"/>
+            <a:endCxn id="1026" idx="1"/>
+          </p:cNvCxnSpPr>
+          <p:nvPr/>
+        </p:nvCxnSpPr>
+        <p:spPr>
+          <a:xfrm>
+            <a:off x="6942997" y="2284402"/>
+            <a:ext cx="715478" cy="2220"/>
+          </a:xfrm>
+          <a:prstGeom prst="straightConnector1">
+            <a:avLst/>
+          </a:prstGeom>
+          <a:ln w="12700">
+            <a:headEnd type="triangle"/>
+            <a:tailEnd type="triangle"/>
+          </a:ln>
+        </p:spPr>
+        <p:style>
+          <a:lnRef idx="1">
+            <a:schemeClr val="accent1"/>
+          </a:lnRef>
+          <a:fillRef idx="0">
+            <a:schemeClr val="accent1"/>
+          </a:fillRef>
+          <a:effectRef idx="0">
+            <a:schemeClr val="accent1"/>
+          </a:effectRef>
+          <a:fontRef idx="minor">
+            <a:schemeClr val="tx1"/>
+          </a:fontRef>
+        </p:style>
+      </p:cxnSp>
+      <p:cxnSp>
+        <p:nvCxnSpPr>
+          <p:cNvPr id="78" name="Straight Arrow Connector 77">
+            <a:extLst>
+              <a:ext uri="{FF2B5EF4-FFF2-40B4-BE49-F238E27FC236}">
+                <a16:creationId xmlns:a16="http://schemas.microsoft.com/office/drawing/2014/main" id="{942429C7-CC50-EF49-B307-EE1A5BA24FEF}"/>
+              </a:ext>
+            </a:extLst>
+          </p:cNvPr>
+          <p:cNvCxnSpPr>
+            <a:cxnSpLocks/>
+            <a:stCxn id="44" idx="3"/>
+            <a:endCxn id="3" idx="1"/>
+          </p:cNvCxnSpPr>
+          <p:nvPr/>
+        </p:nvCxnSpPr>
+        <p:spPr>
+          <a:xfrm>
+            <a:off x="5394182" y="1343828"/>
+            <a:ext cx="1033387" cy="940574"/>
+          </a:xfrm>
+          <a:prstGeom prst="straightConnector1">
+            <a:avLst/>
+          </a:prstGeom>
+          <a:ln w="12700">
+            <a:headEnd type="triangle"/>
+            <a:tailEnd type="triangle"/>
+          </a:ln>
+        </p:spPr>
+        <p:style>
+          <a:lnRef idx="1">
+            <a:schemeClr val="accent1"/>
+          </a:lnRef>
+          <a:fillRef idx="0">
+            <a:schemeClr val="accent1"/>
+          </a:fillRef>
+          <a:effectRef idx="0">
+            <a:schemeClr val="accent1"/>
+          </a:effectRef>
+          <a:fontRef idx="minor">
+            <a:schemeClr val="tx1"/>
+          </a:fontRef>
+        </p:style>
+      </p:cxnSp>
+      <p:cxnSp>
+        <p:nvCxnSpPr>
+          <p:cNvPr id="81" name="Straight Arrow Connector 80">
+            <a:extLst>
+              <a:ext uri="{FF2B5EF4-FFF2-40B4-BE49-F238E27FC236}">
+                <a16:creationId xmlns:a16="http://schemas.microsoft.com/office/drawing/2014/main" id="{8A31F7BC-AA9A-6649-B8F7-76216CDBCE8C}"/>
+              </a:ext>
+            </a:extLst>
+          </p:cNvPr>
+          <p:cNvCxnSpPr>
+            <a:cxnSpLocks/>
+            <a:stCxn id="109" idx="3"/>
+            <a:endCxn id="3" idx="1"/>
+          </p:cNvCxnSpPr>
+          <p:nvPr/>
+        </p:nvCxnSpPr>
+        <p:spPr>
+          <a:xfrm flipV="1">
+            <a:off x="5199403" y="2284402"/>
+            <a:ext cx="1228166" cy="862364"/>
+          </a:xfrm>
+          <a:prstGeom prst="straightConnector1">
+            <a:avLst/>
+          </a:prstGeom>
+          <a:ln w="12700">
+            <a:headEnd type="triangle"/>
+            <a:tailEnd type="triangle"/>
+          </a:ln>
+        </p:spPr>
+        <p:style>
+          <a:lnRef idx="1">
+            <a:schemeClr val="accent1"/>
+          </a:lnRef>
+          <a:fillRef idx="0">
+            <a:schemeClr val="accent1"/>
+          </a:fillRef>
+          <a:effectRef idx="0">
+            <a:schemeClr val="accent1"/>
+          </a:effectRef>
+          <a:fontRef idx="minor">
+            <a:schemeClr val="tx1"/>
+          </a:fontRef>
+        </p:style>
+      </p:cxnSp>
+      <p:pic>
+        <p:nvPicPr>
+          <p:cNvPr id="1026" name="Picture 2" descr="Server Png Images, Server Icon Free Download - Server Icon Clipart (1600x1600), Png Download">
+            <a:extLst>
+              <a:ext uri="{FF2B5EF4-FFF2-40B4-BE49-F238E27FC236}">
+                <a16:creationId xmlns:a16="http://schemas.microsoft.com/office/drawing/2014/main" id="{CF076570-4413-F849-8C19-F985704B17CD}"/>
+              </a:ext>
+            </a:extLst>
+          </p:cNvPr>
+          <p:cNvPicPr>
+            <a:picLocks noChangeAspect="1" noChangeArrowheads="1"/>
+          </p:cNvPicPr>
+          <p:nvPr/>
+        </p:nvPicPr>
+        <p:blipFill>
+          <a:blip r:embed="rId23">
+            <a:extLst>
+              <a:ext uri="{28A0092B-C50C-407E-A947-70E740481C1C}">
+                <a14:useLocalDpi xmlns:a14="http://schemas.microsoft.com/office/drawing/2010/main" val="0"/>
+              </a:ext>
+            </a:extLst>
+          </a:blip>
+          <a:srcRect/>
+          <a:stretch>
+            <a:fillRect/>
+          </a:stretch>
+        </p:blipFill>
+        <p:spPr bwMode="auto">
+          <a:xfrm>
+            <a:off x="7658475" y="1951144"/>
+            <a:ext cx="670955" cy="670955"/>
+          </a:xfrm>
+          <a:prstGeom prst="rect">
+            <a:avLst/>
+          </a:prstGeom>
+          <a:noFill/>
+          <a:extLst>
+            <a:ext uri="{909E8E84-426E-40DD-AFC4-6F175D3DCCD1}">
+              <a14:hiddenFill xmlns:a14="http://schemas.microsoft.com/office/drawing/2010/main">
+                <a:solidFill>
+                  <a:srgbClr val="FFFFFF"/>
+                </a:solidFill>
+              </a14:hiddenFill>
+            </a:ext>
+          </a:extLst>
+        </p:spPr>
+      </p:pic>
+      <p:cxnSp>
+        <p:nvCxnSpPr>
+          <p:cNvPr id="61" name="Straight Connector 60">
+            <a:extLst>
+              <a:ext uri="{FF2B5EF4-FFF2-40B4-BE49-F238E27FC236}">
+                <a16:creationId xmlns:a16="http://schemas.microsoft.com/office/drawing/2014/main" id="{C8C64262-EE12-B84A-904F-E6442A8ED4CB}"/>
+              </a:ext>
+            </a:extLst>
+          </p:cNvPr>
+          <p:cNvCxnSpPr/>
+          <p:nvPr/>
+        </p:nvCxnSpPr>
+        <p:spPr>
+          <a:xfrm>
+            <a:off x="4907512" y="443940"/>
+            <a:ext cx="4683696" cy="0"/>
+          </a:xfrm>
+          <a:prstGeom prst="line">
+            <a:avLst/>
+          </a:prstGeom>
+          <a:ln w="12700"/>
+        </p:spPr>
+        <p:style>
+          <a:lnRef idx="1">
+            <a:schemeClr val="accent1"/>
+          </a:lnRef>
+          <a:fillRef idx="0">
+            <a:schemeClr val="accent1"/>
+          </a:fillRef>
+          <a:effectRef idx="0">
+            <a:schemeClr val="accent1"/>
+          </a:effectRef>
+          <a:fontRef idx="minor">
+            <a:schemeClr val="tx1"/>
+          </a:fontRef>
+        </p:style>
+      </p:cxnSp>
+      <p:cxnSp>
+        <p:nvCxnSpPr>
+          <p:cNvPr id="63" name="Straight Connector 62">
+            <a:extLst>
+              <a:ext uri="{FF2B5EF4-FFF2-40B4-BE49-F238E27FC236}">
+                <a16:creationId xmlns:a16="http://schemas.microsoft.com/office/drawing/2014/main" id="{23278254-952A-0849-AB8F-638488A672FE}"/>
+              </a:ext>
+            </a:extLst>
+          </p:cNvPr>
+          <p:cNvCxnSpPr/>
+          <p:nvPr/>
+        </p:nvCxnSpPr>
+        <p:spPr>
+          <a:xfrm>
+            <a:off x="4907512" y="443940"/>
+            <a:ext cx="0" cy="134037"/>
+          </a:xfrm>
+          <a:prstGeom prst="line">
+            <a:avLst/>
+          </a:prstGeom>
+          <a:ln w="12700"/>
+        </p:spPr>
+        <p:style>
+          <a:lnRef idx="1">
+            <a:schemeClr val="accent1"/>
+          </a:lnRef>
+          <a:fillRef idx="0">
+            <a:schemeClr val="accent1"/>
+          </a:fillRef>
+          <a:effectRef idx="0">
+            <a:schemeClr val="accent1"/>
+          </a:effectRef>
+          <a:fontRef idx="minor">
+            <a:schemeClr val="tx1"/>
+          </a:fontRef>
+        </p:style>
+      </p:cxnSp>
+      <p:cxnSp>
+        <p:nvCxnSpPr>
+          <p:cNvPr id="102" name="Straight Connector 101">
+            <a:extLst>
+              <a:ext uri="{FF2B5EF4-FFF2-40B4-BE49-F238E27FC236}">
+                <a16:creationId xmlns:a16="http://schemas.microsoft.com/office/drawing/2014/main" id="{F1E43E10-6215-0942-B009-EB0F051C47BC}"/>
+              </a:ext>
+            </a:extLst>
+          </p:cNvPr>
+          <p:cNvCxnSpPr/>
+          <p:nvPr/>
+        </p:nvCxnSpPr>
+        <p:spPr>
+          <a:xfrm>
+            <a:off x="9592583" y="443940"/>
+            <a:ext cx="0" cy="134037"/>
+          </a:xfrm>
+          <a:prstGeom prst="line">
+            <a:avLst/>
+          </a:prstGeom>
+          <a:ln w="12700"/>
+        </p:spPr>
+        <p:style>
+          <a:lnRef idx="1">
+            <a:schemeClr val="accent1"/>
+          </a:lnRef>
+          <a:fillRef idx="0">
+            <a:schemeClr val="accent1"/>
+          </a:fillRef>
+          <a:effectRef idx="0">
+            <a:schemeClr val="accent1"/>
+          </a:effectRef>
+          <a:fontRef idx="minor">
+            <a:schemeClr val="tx1"/>
+          </a:fontRef>
+        </p:style>
+      </p:cxnSp>
+      <p:sp>
+        <p:nvSpPr>
+          <p:cNvPr id="65" name="TextBox 64">
+            <a:extLst>
+              <a:ext uri="{FF2B5EF4-FFF2-40B4-BE49-F238E27FC236}">
+                <a16:creationId xmlns:a16="http://schemas.microsoft.com/office/drawing/2014/main" id="{594ADF22-CDC4-9649-A952-29DE9EACB4FB}"/>
+              </a:ext>
+            </a:extLst>
+          </p:cNvPr>
+          <p:cNvSpPr txBox="1"/>
+          <p:nvPr/>
+        </p:nvSpPr>
+        <p:spPr>
+          <a:xfrm>
+            <a:off x="6063169" y="92470"/>
+            <a:ext cx="2372381" cy="338554"/>
+          </a:xfrm>
+          <a:prstGeom prst="rect">
+            <a:avLst/>
+          </a:prstGeom>
+          <a:noFill/>
+        </p:spPr>
+        <p:txBody>
+          <a:bodyPr wrap="none" rtlCol="0">
+            <a:spAutoFit/>
+          </a:bodyPr>
+          <a:lstStyle/>
+          <a:p>
+            <a:r>
+              <a:rPr lang="en-GB" sz="1600" dirty="0"/>
+              <a:t>De-Militarized Zone - DMZ</a:t>
+            </a:r>
+            <a:endParaRPr lang="en-IT" sz="1600" dirty="0"/>
+          </a:p>
+        </p:txBody>
+      </p:sp>
+      <p:sp>
+        <p:nvSpPr>
+          <p:cNvPr id="66" name="TextBox 65">
+            <a:extLst>
+              <a:ext uri="{FF2B5EF4-FFF2-40B4-BE49-F238E27FC236}">
+                <a16:creationId xmlns:a16="http://schemas.microsoft.com/office/drawing/2014/main" id="{EBC2C19E-0335-9D4F-9B96-BA4FCF7E5044}"/>
+              </a:ext>
+            </a:extLst>
+          </p:cNvPr>
+          <p:cNvSpPr txBox="1"/>
+          <p:nvPr/>
+        </p:nvSpPr>
+        <p:spPr>
+          <a:xfrm>
+            <a:off x="6177444" y="2507252"/>
+            <a:ext cx="1061509" cy="276999"/>
+          </a:xfrm>
+          <a:prstGeom prst="rect">
+            <a:avLst/>
+          </a:prstGeom>
+          <a:noFill/>
+        </p:spPr>
+        <p:txBody>
+          <a:bodyPr wrap="none" rtlCol="0">
+            <a:spAutoFit/>
+          </a:bodyPr>
+          <a:lstStyle/>
+          <a:p>
+            <a:r>
+              <a:rPr lang="en-IT" sz="1200" dirty="0"/>
+              <a:t>Load Balancer</a:t>
+            </a:r>
           </a:p>
         </p:txBody>
       </p:sp>
@@ -5433,4 +6158,299 @@
     </a:ext>
   </a:extLst>
 </a:theme>
+</file>
+
+<file path=ppt/theme/theme2.xml><?xml version="1.0" encoding="utf-8"?>
+<a:theme xmlns:a="http://schemas.openxmlformats.org/drawingml/2006/main" name="Office Theme">
+  <a:themeElements>
+    <a:clrScheme name="Office">
+      <a:dk1>
+        <a:sysClr val="windowText" lastClr="000000"/>
+      </a:dk1>
+      <a:lt1>
+        <a:sysClr val="window" lastClr="FFFFFF"/>
+      </a:lt1>
+      <a:dk2>
+        <a:srgbClr val="44546A"/>
+      </a:dk2>
+      <a:lt2>
+        <a:srgbClr val="E7E6E6"/>
+      </a:lt2>
+      <a:accent1>
+        <a:srgbClr val="4472C4"/>
+      </a:accent1>
+      <a:accent2>
+        <a:srgbClr val="ED7D31"/>
+      </a:accent2>
+      <a:accent3>
+        <a:srgbClr val="A5A5A5"/>
+      </a:accent3>
+      <a:accent4>
+        <a:srgbClr val="FFC000"/>
+      </a:accent4>
+      <a:accent5>
+        <a:srgbClr val="5B9BD5"/>
+      </a:accent5>
+      <a:accent6>
+        <a:srgbClr val="70AD47"/>
+      </a:accent6>
+      <a:hlink>
+        <a:srgbClr val="0563C1"/>
+      </a:hlink>
+      <a:folHlink>
+        <a:srgbClr val="954F72"/>
+      </a:folHlink>
+    </a:clrScheme>
+    <a:fontScheme name="Office">
+      <a:majorFont>
+        <a:latin typeface="Calibri Light" panose="020F0302020204030204"/>
+        <a:ea typeface=""/>
+        <a:cs typeface=""/>
+        <a:font script="Jpan" typeface="游ゴシック Light"/>
+        <a:font script="Hang" typeface="맑은 고딕"/>
+        <a:font script="Hans" typeface="等线 Light"/>
+        <a:font script="Hant" typeface="新細明體"/>
+        <a:font script="Arab" typeface="Times New Roman"/>
+        <a:font script="Hebr" typeface="Times New Roman"/>
+        <a:font script="Thai" typeface="Angsana New"/>
+        <a:font script="Ethi" typeface="Nyala"/>
+        <a:font script="Beng" typeface="Vrinda"/>
+        <a:font script="Gujr" typeface="Shruti"/>
+        <a:font script="Khmr" typeface="MoolBoran"/>
+        <a:font script="Knda" typeface="Tunga"/>
+        <a:font script="Guru" typeface="Raavi"/>
+        <a:font script="Cans" typeface="Euphemia"/>
+        <a:font script="Cher" typeface="Plantagenet Cherokee"/>
+        <a:font script="Yiii" typeface="Microsoft Yi Baiti"/>
+        <a:font script="Tibt" typeface="Microsoft Himalaya"/>
+        <a:font script="Thaa" typeface="MV Boli"/>
+        <a:font script="Deva" typeface="Mangal"/>
+        <a:font script="Telu" typeface="Gautami"/>
+        <a:font script="Taml" typeface="Latha"/>
+        <a:font script="Syrc" typeface="Estrangelo Edessa"/>
+        <a:font script="Orya" typeface="Kalinga"/>
+        <a:font script="Mlym" typeface="Kartika"/>
+        <a:font script="Laoo" typeface="DokChampa"/>
+        <a:font script="Sinh" typeface="Iskoola Pota"/>
+        <a:font script="Mong" typeface="Mongolian Baiti"/>
+        <a:font script="Viet" typeface="Times New Roman"/>
+        <a:font script="Uigh" typeface="Microsoft Uighur"/>
+        <a:font script="Geor" typeface="Sylfaen"/>
+        <a:font script="Armn" typeface="Arial"/>
+        <a:font script="Bugi" typeface="Leelawadee UI"/>
+        <a:font script="Bopo" typeface="Microsoft JhengHei"/>
+        <a:font script="Java" typeface="Javanese Text"/>
+        <a:font script="Lisu" typeface="Segoe UI"/>
+        <a:font script="Mymr" typeface="Myanmar Text"/>
+        <a:font script="Nkoo" typeface="Ebrima"/>
+        <a:font script="Olck" typeface="Nirmala UI"/>
+        <a:font script="Osma" typeface="Ebrima"/>
+        <a:font script="Phag" typeface="Phagspa"/>
+        <a:font script="Syrn" typeface="Estrangelo Edessa"/>
+        <a:font script="Syrj" typeface="Estrangelo Edessa"/>
+        <a:font script="Syre" typeface="Estrangelo Edessa"/>
+        <a:font script="Sora" typeface="Nirmala UI"/>
+        <a:font script="Tale" typeface="Microsoft Tai Le"/>
+        <a:font script="Talu" typeface="Microsoft New Tai Lue"/>
+        <a:font script="Tfng" typeface="Ebrima"/>
+      </a:majorFont>
+      <a:minorFont>
+        <a:latin typeface="Calibri" panose="020F0502020204030204"/>
+        <a:ea typeface=""/>
+        <a:cs typeface=""/>
+        <a:font script="Jpan" typeface="游ゴシック"/>
+        <a:font script="Hang" typeface="맑은 고딕"/>
+        <a:font script="Hans" typeface="等线"/>
+        <a:font script="Hant" typeface="新細明體"/>
+        <a:font script="Arab" typeface="Arial"/>
+        <a:font script="Hebr" typeface="Arial"/>
+        <a:font script="Thai" typeface="Cordia New"/>
+        <a:font script="Ethi" typeface="Nyala"/>
+        <a:font script="Beng" typeface="Vrinda"/>
+        <a:font script="Gujr" typeface="Shruti"/>
+        <a:font script="Khmr" typeface="DaunPenh"/>
+        <a:font script="Knda" typeface="Tunga"/>
+        <a:font script="Guru" typeface="Raavi"/>
+        <a:font script="Cans" typeface="Euphemia"/>
+        <a:font script="Cher" typeface="Plantagenet Cherokee"/>
+        <a:font script="Yiii" typeface="Microsoft Yi Baiti"/>
+        <a:font script="Tibt" typeface="Microsoft Himalaya"/>
+        <a:font script="Thaa" typeface="MV Boli"/>
+        <a:font script="Deva" typeface="Mangal"/>
+        <a:font script="Telu" typeface="Gautami"/>
+        <a:font script="Taml" typeface="Latha"/>
+        <a:font script="Syrc" typeface="Estrangelo Edessa"/>
+        <a:font script="Orya" typeface="Kalinga"/>
+        <a:font script="Mlym" typeface="Kartika"/>
+        <a:font script="Laoo" typeface="DokChampa"/>
+        <a:font script="Sinh" typeface="Iskoola Pota"/>
+        <a:font script="Mong" typeface="Mongolian Baiti"/>
+        <a:font script="Viet" typeface="Arial"/>
+        <a:font script="Uigh" typeface="Microsoft Uighur"/>
+        <a:font script="Geor" typeface="Sylfaen"/>
+        <a:font script="Armn" typeface="Arial"/>
+        <a:font script="Bugi" typeface="Leelawadee UI"/>
+        <a:font script="Bopo" typeface="Microsoft JhengHei"/>
+        <a:font script="Java" typeface="Javanese Text"/>
+        <a:font script="Lisu" typeface="Segoe UI"/>
+        <a:font script="Mymr" typeface="Myanmar Text"/>
+        <a:font script="Nkoo" typeface="Ebrima"/>
+        <a:font script="Olck" typeface="Nirmala UI"/>
+        <a:font script="Osma" typeface="Ebrima"/>
+        <a:font script="Phag" typeface="Phagspa"/>
+        <a:font script="Syrn" typeface="Estrangelo Edessa"/>
+        <a:font script="Syrj" typeface="Estrangelo Edessa"/>
+        <a:font script="Syre" typeface="Estrangelo Edessa"/>
+        <a:font script="Sora" typeface="Nirmala UI"/>
+        <a:font script="Tale" typeface="Microsoft Tai Le"/>
+        <a:font script="Talu" typeface="Microsoft New Tai Lue"/>
+        <a:font script="Tfng" typeface="Ebrima"/>
+      </a:minorFont>
+    </a:fontScheme>
+    <a:fmtScheme name="Office">
+      <a:fillStyleLst>
+        <a:solidFill>
+          <a:schemeClr val="phClr"/>
+        </a:solidFill>
+        <a:gradFill rotWithShape="1">
+          <a:gsLst>
+            <a:gs pos="0">
+              <a:schemeClr val="phClr">
+                <a:lumMod val="110000"/>
+                <a:satMod val="105000"/>
+                <a:tint val="67000"/>
+              </a:schemeClr>
+            </a:gs>
+            <a:gs pos="50000">
+              <a:schemeClr val="phClr">
+                <a:lumMod val="105000"/>
+                <a:satMod val="103000"/>
+                <a:tint val="73000"/>
+              </a:schemeClr>
+            </a:gs>
+            <a:gs pos="100000">
+              <a:schemeClr val="phClr">
+                <a:lumMod val="105000"/>
+                <a:satMod val="109000"/>
+                <a:tint val="81000"/>
+              </a:schemeClr>
+            </a:gs>
+          </a:gsLst>
+          <a:lin ang="5400000" scaled="0"/>
+        </a:gradFill>
+        <a:gradFill rotWithShape="1">
+          <a:gsLst>
+            <a:gs pos="0">
+              <a:schemeClr val="phClr">
+                <a:satMod val="103000"/>
+                <a:lumMod val="102000"/>
+                <a:tint val="94000"/>
+              </a:schemeClr>
+            </a:gs>
+            <a:gs pos="50000">
+              <a:schemeClr val="phClr">
+                <a:satMod val="110000"/>
+                <a:lumMod val="100000"/>
+                <a:shade val="100000"/>
+              </a:schemeClr>
+            </a:gs>
+            <a:gs pos="100000">
+              <a:schemeClr val="phClr">
+                <a:lumMod val="99000"/>
+                <a:satMod val="120000"/>
+                <a:shade val="78000"/>
+              </a:schemeClr>
+            </a:gs>
+          </a:gsLst>
+          <a:lin ang="5400000" scaled="0"/>
+        </a:gradFill>
+      </a:fillStyleLst>
+      <a:lnStyleLst>
+        <a:ln w="6350" cap="flat" cmpd="sng" algn="ctr">
+          <a:solidFill>
+            <a:schemeClr val="phClr"/>
+          </a:solidFill>
+          <a:prstDash val="solid"/>
+          <a:miter lim="800000"/>
+        </a:ln>
+        <a:ln w="12700" cap="flat" cmpd="sng" algn="ctr">
+          <a:solidFill>
+            <a:schemeClr val="phClr"/>
+          </a:solidFill>
+          <a:prstDash val="solid"/>
+          <a:miter lim="800000"/>
+        </a:ln>
+        <a:ln w="19050" cap="flat" cmpd="sng" algn="ctr">
+          <a:solidFill>
+            <a:schemeClr val="phClr"/>
+          </a:solidFill>
+          <a:prstDash val="solid"/>
+          <a:miter lim="800000"/>
+        </a:ln>
+      </a:lnStyleLst>
+      <a:effectStyleLst>
+        <a:effectStyle>
+          <a:effectLst/>
+        </a:effectStyle>
+        <a:effectStyle>
+          <a:effectLst/>
+        </a:effectStyle>
+        <a:effectStyle>
+          <a:effectLst>
+            <a:outerShdw blurRad="57150" dist="19050" dir="5400000" algn="ctr" rotWithShape="0">
+              <a:srgbClr val="000000">
+                <a:alpha val="63000"/>
+              </a:srgbClr>
+            </a:outerShdw>
+          </a:effectLst>
+        </a:effectStyle>
+      </a:effectStyleLst>
+      <a:bgFillStyleLst>
+        <a:solidFill>
+          <a:schemeClr val="phClr"/>
+        </a:solidFill>
+        <a:solidFill>
+          <a:schemeClr val="phClr">
+            <a:tint val="95000"/>
+            <a:satMod val="170000"/>
+          </a:schemeClr>
+        </a:solidFill>
+        <a:gradFill rotWithShape="1">
+          <a:gsLst>
+            <a:gs pos="0">
+              <a:schemeClr val="phClr">
+                <a:tint val="93000"/>
+                <a:satMod val="150000"/>
+                <a:shade val="98000"/>
+                <a:lumMod val="102000"/>
+              </a:schemeClr>
+            </a:gs>
+            <a:gs pos="50000">
+              <a:schemeClr val="phClr">
+                <a:tint val="98000"/>
+                <a:satMod val="130000"/>
+                <a:shade val="90000"/>
+                <a:lumMod val="103000"/>
+              </a:schemeClr>
+            </a:gs>
+            <a:gs pos="100000">
+              <a:schemeClr val="phClr">
+                <a:shade val="63000"/>
+                <a:satMod val="120000"/>
+              </a:schemeClr>
+            </a:gs>
+          </a:gsLst>
+          <a:lin ang="5400000" scaled="0"/>
+        </a:gradFill>
+      </a:bgFillStyleLst>
+    </a:fmtScheme>
+  </a:themeElements>
+  <a:objectDefaults/>
+  <a:extraClrSchemeLst/>
+  <a:extLst>
+    <a:ext uri="{05A4C25C-085E-4340-85A3-A5531E510DB2}">
+      <thm15:themeFamily xmlns:thm15="http://schemas.microsoft.com/office/thememl/2012/main" name="Office Theme" id="{62F939B6-93AF-4DB8-9C6B-D6C7DFDC589F}" vid="{4A3C46E8-61CC-4603-A589-7422A47A8E4A}"/>
+    </a:ext>
+  </a:extLst>
+</a:theme>
 </file>
</xml_diff>

<commit_message>
Finished the architecture part
</commit_message>
<xml_diff>
--- a/DD/PPTImageTool/PPTImage.pptx
+++ b/DD/PPTImageTool/PPTImage.pptx
@@ -198,7 +198,7 @@
           <a:p>
             <a:fld id="{200D96AB-166C-0C40-AA95-F65B049874A8}" type="datetimeFigureOut">
               <a:rPr lang="en-IT" smtClean="0"/>
-              <a:t>05/01/21</a:t>
+              <a:t>07/01/21</a:t>
             </a:fld>
             <a:endParaRPr lang="en-IT"/>
           </a:p>
@@ -699,7 +699,7 @@
           <a:p>
             <a:fld id="{6C501815-BB34-A14B-8F76-37AD9B275987}" type="datetimeFigureOut">
               <a:rPr lang="en-IT" smtClean="0"/>
-              <a:t>05/01/21</a:t>
+              <a:t>07/01/21</a:t>
             </a:fld>
             <a:endParaRPr lang="en-IT"/>
           </a:p>
@@ -899,7 +899,7 @@
           <a:p>
             <a:fld id="{6C501815-BB34-A14B-8F76-37AD9B275987}" type="datetimeFigureOut">
               <a:rPr lang="en-IT" smtClean="0"/>
-              <a:t>05/01/21</a:t>
+              <a:t>07/01/21</a:t>
             </a:fld>
             <a:endParaRPr lang="en-IT"/>
           </a:p>
@@ -1109,7 +1109,7 @@
           <a:p>
             <a:fld id="{6C501815-BB34-A14B-8F76-37AD9B275987}" type="datetimeFigureOut">
               <a:rPr lang="en-IT" smtClean="0"/>
-              <a:t>05/01/21</a:t>
+              <a:t>07/01/21</a:t>
             </a:fld>
             <a:endParaRPr lang="en-IT"/>
           </a:p>
@@ -1309,7 +1309,7 @@
           <a:p>
             <a:fld id="{6C501815-BB34-A14B-8F76-37AD9B275987}" type="datetimeFigureOut">
               <a:rPr lang="en-IT" smtClean="0"/>
-              <a:t>05/01/21</a:t>
+              <a:t>07/01/21</a:t>
             </a:fld>
             <a:endParaRPr lang="en-IT"/>
           </a:p>
@@ -1585,7 +1585,7 @@
           <a:p>
             <a:fld id="{6C501815-BB34-A14B-8F76-37AD9B275987}" type="datetimeFigureOut">
               <a:rPr lang="en-IT" smtClean="0"/>
-              <a:t>05/01/21</a:t>
+              <a:t>07/01/21</a:t>
             </a:fld>
             <a:endParaRPr lang="en-IT"/>
           </a:p>
@@ -1853,7 +1853,7 @@
           <a:p>
             <a:fld id="{6C501815-BB34-A14B-8F76-37AD9B275987}" type="datetimeFigureOut">
               <a:rPr lang="en-IT" smtClean="0"/>
-              <a:t>05/01/21</a:t>
+              <a:t>07/01/21</a:t>
             </a:fld>
             <a:endParaRPr lang="en-IT"/>
           </a:p>
@@ -2268,7 +2268,7 @@
           <a:p>
             <a:fld id="{6C501815-BB34-A14B-8F76-37AD9B275987}" type="datetimeFigureOut">
               <a:rPr lang="en-IT" smtClean="0"/>
-              <a:t>05/01/21</a:t>
+              <a:t>07/01/21</a:t>
             </a:fld>
             <a:endParaRPr lang="en-IT"/>
           </a:p>
@@ -2410,7 +2410,7 @@
           <a:p>
             <a:fld id="{6C501815-BB34-A14B-8F76-37AD9B275987}" type="datetimeFigureOut">
               <a:rPr lang="en-IT" smtClean="0"/>
-              <a:t>05/01/21</a:t>
+              <a:t>07/01/21</a:t>
             </a:fld>
             <a:endParaRPr lang="en-IT"/>
           </a:p>
@@ -2523,7 +2523,7 @@
           <a:p>
             <a:fld id="{6C501815-BB34-A14B-8F76-37AD9B275987}" type="datetimeFigureOut">
               <a:rPr lang="en-IT" smtClean="0"/>
-              <a:t>05/01/21</a:t>
+              <a:t>07/01/21</a:t>
             </a:fld>
             <a:endParaRPr lang="en-IT"/>
           </a:p>
@@ -2836,7 +2836,7 @@
           <a:p>
             <a:fld id="{6C501815-BB34-A14B-8F76-37AD9B275987}" type="datetimeFigureOut">
               <a:rPr lang="en-IT" smtClean="0"/>
-              <a:t>05/01/21</a:t>
+              <a:t>07/01/21</a:t>
             </a:fld>
             <a:endParaRPr lang="en-IT"/>
           </a:p>
@@ -3125,7 +3125,7 @@
           <a:p>
             <a:fld id="{6C501815-BB34-A14B-8F76-37AD9B275987}" type="datetimeFigureOut">
               <a:rPr lang="en-IT" smtClean="0"/>
-              <a:t>05/01/21</a:t>
+              <a:t>07/01/21</a:t>
             </a:fld>
             <a:endParaRPr lang="en-IT"/>
           </a:p>
@@ -3368,7 +3368,7 @@
           <a:p>
             <a:fld id="{6C501815-BB34-A14B-8F76-37AD9B275987}" type="datetimeFigureOut">
               <a:rPr lang="en-IT" smtClean="0"/>
-              <a:t>05/01/21</a:t>
+              <a:t>07/01/21</a:t>
             </a:fld>
             <a:endParaRPr lang="en-IT"/>
           </a:p>
@@ -4997,7 +4997,7 @@
         </p:blipFill>
         <p:spPr>
           <a:xfrm>
-            <a:off x="4482855" y="4219275"/>
+            <a:off x="3942820" y="4382992"/>
             <a:ext cx="849313" cy="885301"/>
           </a:xfrm>
           <a:prstGeom prst="rect">
@@ -5019,7 +5019,7 @@
         </p:nvSpPr>
         <p:spPr>
           <a:xfrm>
-            <a:off x="4180208" y="5066524"/>
+            <a:off x="3726708" y="5244380"/>
             <a:ext cx="1375569" cy="276999"/>
           </a:xfrm>
           <a:prstGeom prst="rect">
@@ -5057,9 +5057,9 @@
           <p:nvPr/>
         </p:nvCxnSpPr>
         <p:spPr>
-          <a:xfrm>
-            <a:off x="4907512" y="3441857"/>
-            <a:ext cx="0" cy="777418"/>
+          <a:xfrm flipH="1">
+            <a:off x="4367477" y="3441857"/>
+            <a:ext cx="540035" cy="941135"/>
           </a:xfrm>
           <a:prstGeom prst="straightConnector1">
             <a:avLst/>
@@ -5822,6 +5822,132 @@
           </a:p>
         </p:txBody>
       </p:sp>
+      <p:pic>
+        <p:nvPicPr>
+          <p:cNvPr id="2" name="Picture 1">
+            <a:extLst>
+              <a:ext uri="{FF2B5EF4-FFF2-40B4-BE49-F238E27FC236}">
+                <a16:creationId xmlns:a16="http://schemas.microsoft.com/office/drawing/2014/main" id="{5F682F0A-6920-574B-A230-84A2B39D8D2A}"/>
+              </a:ext>
+            </a:extLst>
+          </p:cNvPr>
+          <p:cNvPicPr>
+            <a:picLocks noChangeAspect="1"/>
+          </p:cNvPicPr>
+          <p:nvPr/>
+        </p:nvPicPr>
+        <p:blipFill>
+          <a:blip r:embed="rId24"/>
+          <a:stretch>
+            <a:fillRect/>
+          </a:stretch>
+        </p:blipFill>
+        <p:spPr>
+          <a:xfrm>
+            <a:off x="5899167" y="4369745"/>
+            <a:ext cx="855496" cy="851793"/>
+          </a:xfrm>
+          <a:prstGeom prst="rect">
+            <a:avLst/>
+          </a:prstGeom>
+        </p:spPr>
+      </p:pic>
+      <p:sp>
+        <p:nvSpPr>
+          <p:cNvPr id="12" name="TextBox 11">
+            <a:extLst>
+              <a:ext uri="{FF2B5EF4-FFF2-40B4-BE49-F238E27FC236}">
+                <a16:creationId xmlns:a16="http://schemas.microsoft.com/office/drawing/2014/main" id="{8D41CEDB-F422-3A45-AB6C-5FE94205BE42}"/>
+              </a:ext>
+            </a:extLst>
+          </p:cNvPr>
+          <p:cNvSpPr txBox="1"/>
+          <p:nvPr/>
+        </p:nvSpPr>
+        <p:spPr>
+          <a:xfrm>
+            <a:off x="5454322" y="5243267"/>
+            <a:ext cx="1831527" cy="276999"/>
+          </a:xfrm>
+          <a:prstGeom prst="rect">
+            <a:avLst/>
+          </a:prstGeom>
+          <a:noFill/>
+        </p:spPr>
+        <p:txBody>
+          <a:bodyPr wrap="none" rtlCol="0">
+            <a:spAutoFit/>
+          </a:bodyPr>
+          <a:lstStyle/>
+          <a:p>
+            <a:r>
+              <a:rPr lang="en-IT" sz="1200" dirty="0"/>
+              <a:t>QRCode</a:t>
+            </a:r>
+            <a:r>
+              <a:rPr lang="zh-CN" altLang="en-US" sz="1200" dirty="0"/>
+              <a:t> </a:t>
+            </a:r>
+            <a:r>
+              <a:rPr lang="en-US" altLang="zh-CN" sz="1200" dirty="0"/>
+              <a:t>Scanned</a:t>
+            </a:r>
+            <a:r>
+              <a:rPr lang="zh-CN" altLang="en-US" sz="1200" dirty="0"/>
+              <a:t> </a:t>
+            </a:r>
+            <a:r>
+              <a:rPr lang="en-US" altLang="zh-CN" sz="1200" dirty="0"/>
+              <a:t>Machine</a:t>
+            </a:r>
+            <a:endParaRPr lang="en-IT" sz="1200" dirty="0"/>
+          </a:p>
+        </p:txBody>
+      </p:sp>
+      <p:cxnSp>
+        <p:nvCxnSpPr>
+          <p:cNvPr id="62" name="Straight Arrow Connector 61">
+            <a:extLst>
+              <a:ext uri="{FF2B5EF4-FFF2-40B4-BE49-F238E27FC236}">
+                <a16:creationId xmlns:a16="http://schemas.microsoft.com/office/drawing/2014/main" id="{04D7F91F-55CE-4E46-A999-C2EB429E331E}"/>
+              </a:ext>
+            </a:extLst>
+          </p:cNvPr>
+          <p:cNvCxnSpPr>
+            <a:cxnSpLocks/>
+            <a:stCxn id="109" idx="2"/>
+            <a:endCxn id="2" idx="0"/>
+          </p:cNvCxnSpPr>
+          <p:nvPr/>
+        </p:nvCxnSpPr>
+        <p:spPr>
+          <a:xfrm>
+            <a:off x="4907512" y="3441857"/>
+            <a:ext cx="1419403" cy="927888"/>
+          </a:xfrm>
+          <a:prstGeom prst="straightConnector1">
+            <a:avLst/>
+          </a:prstGeom>
+          <a:ln w="12700">
+            <a:headEnd type="triangle"/>
+            <a:tailEnd type="triangle"/>
+          </a:ln>
+        </p:spPr>
+        <p:style>
+          <a:lnRef idx="1">
+            <a:schemeClr val="accent1"/>
+          </a:lnRef>
+          <a:fillRef idx="0">
+            <a:schemeClr val="accent1"/>
+          </a:fillRef>
+          <a:effectRef idx="0">
+            <a:schemeClr val="accent1"/>
+          </a:effectRef>
+          <a:fontRef idx="minor">
+            <a:schemeClr val="tx1"/>
+          </a:fontRef>
+        </p:style>
+      </p:cxnSp>
     </p:spTree>
     <p:extLst>
       <p:ext uri="{BB962C8B-B14F-4D97-AF65-F5344CB8AC3E}">

</xml_diff>